<commit_message>
reduced to 2 slided
</commit_message>
<xml_diff>
--- a/GitHub.pptx
+++ b/GitHub.pptx
@@ -5,10 +5,8 @@
     <p:sldMasterId id="2147483648" r:id="rId1"/>
   </p:sldMasterIdLst>
   <p:sldIdLst>
-    <p:sldId id="259" r:id="rId2"/>
-    <p:sldId id="256" r:id="rId3"/>
-    <p:sldId id="257" r:id="rId4"/>
-    <p:sldId id="258" r:id="rId5"/>
+    <p:sldId id="257" r:id="rId2"/>
+    <p:sldId id="258" r:id="rId3"/>
   </p:sldIdLst>
   <p:sldSz cx="12192000" cy="6858000"/>
   <p:notesSz cx="6858000" cy="9144000"/>
@@ -107,6 +105,11 @@
       </a:defRPr>
     </a:lvl9pPr>
   </p:defaultTextStyle>
+  <p:extLst>
+    <p:ext uri="{EFAFB233-063F-42B5-8137-9DF3F51BA10A}">
+      <p15:sldGuideLst xmlns:p15="http://schemas.microsoft.com/office/powerpoint/2012/main"/>
+    </p:ext>
+  </p:extLst>
 </p:presentation>
 </file>
 
@@ -241,7 +244,7 @@
           <a:p>
             <a:fld id="{01F0D5E7-E9C6-4610-85F0-5CA43F840599}" type="datetimeFigureOut">
               <a:rPr lang="en-IN" smtClean="0"/>
-              <a:t>28-05-2023</a:t>
+              <a:t>29-05-2023</a:t>
             </a:fld>
             <a:endParaRPr lang="en-IN"/>
           </a:p>
@@ -411,7 +414,7 @@
           <a:p>
             <a:fld id="{01F0D5E7-E9C6-4610-85F0-5CA43F840599}" type="datetimeFigureOut">
               <a:rPr lang="en-IN" smtClean="0"/>
-              <a:t>28-05-2023</a:t>
+              <a:t>29-05-2023</a:t>
             </a:fld>
             <a:endParaRPr lang="en-IN"/>
           </a:p>
@@ -591,7 +594,7 @@
           <a:p>
             <a:fld id="{01F0D5E7-E9C6-4610-85F0-5CA43F840599}" type="datetimeFigureOut">
               <a:rPr lang="en-IN" smtClean="0"/>
-              <a:t>28-05-2023</a:t>
+              <a:t>29-05-2023</a:t>
             </a:fld>
             <a:endParaRPr lang="en-IN"/>
           </a:p>
@@ -761,7 +764,7 @@
           <a:p>
             <a:fld id="{01F0D5E7-E9C6-4610-85F0-5CA43F840599}" type="datetimeFigureOut">
               <a:rPr lang="en-IN" smtClean="0"/>
-              <a:t>28-05-2023</a:t>
+              <a:t>29-05-2023</a:t>
             </a:fld>
             <a:endParaRPr lang="en-IN"/>
           </a:p>
@@ -1007,7 +1010,7 @@
           <a:p>
             <a:fld id="{01F0D5E7-E9C6-4610-85F0-5CA43F840599}" type="datetimeFigureOut">
               <a:rPr lang="en-IN" smtClean="0"/>
-              <a:t>28-05-2023</a:t>
+              <a:t>29-05-2023</a:t>
             </a:fld>
             <a:endParaRPr lang="en-IN"/>
           </a:p>
@@ -1239,7 +1242,7 @@
           <a:p>
             <a:fld id="{01F0D5E7-E9C6-4610-85F0-5CA43F840599}" type="datetimeFigureOut">
               <a:rPr lang="en-IN" smtClean="0"/>
-              <a:t>28-05-2023</a:t>
+              <a:t>29-05-2023</a:t>
             </a:fld>
             <a:endParaRPr lang="en-IN"/>
           </a:p>
@@ -1606,7 +1609,7 @@
           <a:p>
             <a:fld id="{01F0D5E7-E9C6-4610-85F0-5CA43F840599}" type="datetimeFigureOut">
               <a:rPr lang="en-IN" smtClean="0"/>
-              <a:t>28-05-2023</a:t>
+              <a:t>29-05-2023</a:t>
             </a:fld>
             <a:endParaRPr lang="en-IN"/>
           </a:p>
@@ -1724,7 +1727,7 @@
           <a:p>
             <a:fld id="{01F0D5E7-E9C6-4610-85F0-5CA43F840599}" type="datetimeFigureOut">
               <a:rPr lang="en-IN" smtClean="0"/>
-              <a:t>28-05-2023</a:t>
+              <a:t>29-05-2023</a:t>
             </a:fld>
             <a:endParaRPr lang="en-IN"/>
           </a:p>
@@ -1819,7 +1822,7 @@
           <a:p>
             <a:fld id="{01F0D5E7-E9C6-4610-85F0-5CA43F840599}" type="datetimeFigureOut">
               <a:rPr lang="en-IN" smtClean="0"/>
-              <a:t>28-05-2023</a:t>
+              <a:t>29-05-2023</a:t>
             </a:fld>
             <a:endParaRPr lang="en-IN"/>
           </a:p>
@@ -2096,7 +2099,7 @@
           <a:p>
             <a:fld id="{01F0D5E7-E9C6-4610-85F0-5CA43F840599}" type="datetimeFigureOut">
               <a:rPr lang="en-IN" smtClean="0"/>
-              <a:t>28-05-2023</a:t>
+              <a:t>29-05-2023</a:t>
             </a:fld>
             <a:endParaRPr lang="en-IN"/>
           </a:p>
@@ -2349,7 +2352,7 @@
           <a:p>
             <a:fld id="{01F0D5E7-E9C6-4610-85F0-5CA43F840599}" type="datetimeFigureOut">
               <a:rPr lang="en-IN" smtClean="0"/>
-              <a:t>28-05-2023</a:t>
+              <a:t>29-05-2023</a:t>
             </a:fld>
             <a:endParaRPr lang="en-IN"/>
           </a:p>
@@ -2562,7 +2565,7 @@
           <a:p>
             <a:fld id="{01F0D5E7-E9C6-4610-85F0-5CA43F840599}" type="datetimeFigureOut">
               <a:rPr lang="en-IN" smtClean="0"/>
-              <a:t>28-05-2023</a:t>
+              <a:t>29-05-2023</a:t>
             </a:fld>
             <a:endParaRPr lang="en-IN"/>
           </a:p>
@@ -3011,7 +3014,7 @@
             <a:spLocks noGrp="1"/>
           </p:cNvSpPr>
           <p:nvPr>
-            <p:ph type="ctrTitle"/>
+            <p:ph type="title"/>
           </p:nvPr>
         </p:nvSpPr>
         <p:spPr/>
@@ -3040,195 +3043,9 @@
           </a:p>
         </p:txBody>
       </p:sp>
-      <p:sp>
-        <p:nvSpPr>
-          <p:cNvPr id="6" name="Text Placeholder 5"/>
-          <p:cNvSpPr>
-            <a:spLocks noGrp="1"/>
-          </p:cNvSpPr>
-          <p:nvPr>
-            <p:ph type="subTitle" idx="1"/>
-          </p:nvPr>
-        </p:nvSpPr>
-        <p:spPr>
-          <a:xfrm>
-            <a:off x="7833360" y="5938520"/>
-            <a:ext cx="5151120" cy="919480"/>
-          </a:xfrm>
-        </p:spPr>
-        <p:txBody>
-          <a:bodyPr>
-            <a:normAutofit/>
-          </a:bodyPr>
-          <a:lstStyle/>
-          <a:p>
-            <a:r>
-              <a:rPr lang="en-IN" i="1" dirty="0" smtClean="0"/>
-              <a:t>Krishna Chaitanya Rakonda</a:t>
-            </a:r>
-          </a:p>
-          <a:p>
-            <a:r>
-              <a:rPr lang="en-IN" i="1" dirty="0" smtClean="0"/>
-              <a:t>U1411226</a:t>
-            </a:r>
-            <a:endParaRPr lang="en-IN" i="1" dirty="0"/>
-          </a:p>
-        </p:txBody>
-      </p:sp>
-    </p:spTree>
-    <p:extLst>
-      <p:ext uri="{BB962C8B-B14F-4D97-AF65-F5344CB8AC3E}">
-        <p14:creationId xmlns:p14="http://schemas.microsoft.com/office/powerpoint/2010/main" val="3681386394"/>
-      </p:ext>
-    </p:extLst>
-  </p:cSld>
-  <p:clrMapOvr>
-    <a:masterClrMapping/>
-  </p:clrMapOvr>
-</p:sld>
-</file>
-
-<file path=ppt/slides/slide2.xml><?xml version="1.0" encoding="utf-8"?>
-<p:sld xmlns:a="http://schemas.openxmlformats.org/drawingml/2006/main" xmlns:r="http://schemas.openxmlformats.org/officeDocument/2006/relationships" xmlns:p="http://schemas.openxmlformats.org/presentationml/2006/main">
-  <p:cSld>
-    <p:bg>
-      <p:bgPr>
-        <a:gradFill>
-          <a:gsLst>
-            <a:gs pos="56000">
-              <a:srgbClr val="D6E6F5"/>
-            </a:gs>
-            <a:gs pos="0">
-              <a:schemeClr val="accent1">
-                <a:lumMod val="5000"/>
-                <a:lumOff val="95000"/>
-              </a:schemeClr>
-            </a:gs>
-            <a:gs pos="74000">
-              <a:schemeClr val="accent1">
-                <a:lumMod val="45000"/>
-                <a:lumOff val="55000"/>
-              </a:schemeClr>
-            </a:gs>
-            <a:gs pos="83000">
-              <a:schemeClr val="accent1">
-                <a:lumMod val="45000"/>
-                <a:lumOff val="55000"/>
-              </a:schemeClr>
-            </a:gs>
-            <a:gs pos="100000">
-              <a:schemeClr val="accent1">
-                <a:lumMod val="30000"/>
-                <a:lumOff val="70000"/>
-              </a:schemeClr>
-            </a:gs>
-          </a:gsLst>
-          <a:lin ang="5400000" scaled="1"/>
-        </a:gradFill>
-        <a:effectLst/>
-      </p:bgPr>
-    </p:bg>
-    <p:spTree>
-      <p:nvGrpSpPr>
-        <p:cNvPr id="1" name=""/>
-        <p:cNvGrpSpPr/>
-        <p:nvPr/>
-      </p:nvGrpSpPr>
-      <p:grpSpPr>
-        <a:xfrm>
-          <a:off x="0" y="0"/>
-          <a:ext cx="0" cy="0"/>
-          <a:chOff x="0" y="0"/>
-          <a:chExt cx="0" cy="0"/>
-        </a:xfrm>
-      </p:grpSpPr>
-      <p:sp>
-        <p:nvSpPr>
-          <p:cNvPr id="4" name="Title 3"/>
-          <p:cNvSpPr>
-            <a:spLocks noGrp="1"/>
-          </p:cNvSpPr>
-          <p:nvPr>
-            <p:ph type="title"/>
-          </p:nvPr>
-        </p:nvSpPr>
-        <p:spPr/>
-        <p:txBody>
-          <a:bodyPr/>
-          <a:lstStyle/>
-          <a:p>
-            <a:pPr algn="ctr"/>
-            <a:r>
-              <a:rPr lang="en-IN" b="1" dirty="0">
-                <a:latin typeface="Arial Black" panose="020B0A04020102020204" pitchFamily="34" charset="0"/>
-              </a:rPr>
-              <a:t>G</a:t>
-            </a:r>
-            <a:r>
-              <a:rPr lang="en-IN" b="1" dirty="0" smtClean="0">
-                <a:latin typeface="Arial Black" panose="020B0A04020102020204" pitchFamily="34" charset="0"/>
-              </a:rPr>
-              <a:t>itHub</a:t>
-            </a:r>
-            <a:r>
-              <a:rPr lang="en-IN" dirty="0" smtClean="0"/>
-              <a:t> </a:t>
-            </a:r>
-            <a:endParaRPr lang="en-IN" dirty="0"/>
-          </a:p>
-        </p:txBody>
-      </p:sp>
-      <p:sp>
-        <p:nvSpPr>
-          <p:cNvPr id="6" name="Text Placeholder 5"/>
-          <p:cNvSpPr>
-            <a:spLocks noGrp="1"/>
-          </p:cNvSpPr>
-          <p:nvPr>
-            <p:ph type="body" sz="half" idx="2"/>
-          </p:nvPr>
-        </p:nvSpPr>
-        <p:spPr/>
-        <p:txBody>
-          <a:bodyPr/>
-          <a:lstStyle/>
-          <a:p>
-            <a:pPr marL="285750" indent="-285750">
-              <a:buFont typeface="Arial" panose="020B0604020202020204" pitchFamily="34" charset="0"/>
-              <a:buChar char="•"/>
-            </a:pPr>
-            <a:r>
-              <a:rPr lang="en-IN" dirty="0" smtClean="0"/>
-              <a:t>A version control platform where one can store and manager code keeping track of changes.</a:t>
-            </a:r>
-          </a:p>
-          <a:p>
-            <a:pPr marL="285750" indent="-285750">
-              <a:buFont typeface="Arial" panose="020B0604020202020204" pitchFamily="34" charset="0"/>
-              <a:buChar char="•"/>
-            </a:pPr>
-            <a:r>
-              <a:rPr lang="en-IN" dirty="0" smtClean="0"/>
-              <a:t>Multiple people on the team can review code and merge changes simultaneously</a:t>
-            </a:r>
-          </a:p>
-          <a:p>
-            <a:pPr marL="285750" indent="-285750">
-              <a:buFont typeface="Arial" panose="020B0604020202020204" pitchFamily="34" charset="0"/>
-              <a:buChar char="•"/>
-            </a:pPr>
-            <a:r>
-              <a:rPr lang="en-IN" dirty="0" smtClean="0"/>
-              <a:t>Helps simplify development process and enhances productivity</a:t>
-            </a:r>
-            <a:endParaRPr lang="en-IN" dirty="0"/>
-          </a:p>
-        </p:txBody>
-      </p:sp>
       <p:pic>
         <p:nvPicPr>
-          <p:cNvPr id="9" name="Content Placeholder 8"/>
+          <p:cNvPr id="7" name="Content Placeholder 6"/>
           <p:cNvPicPr>
             <a:picLocks noGrp="1" noChangeAspect="1"/>
           </p:cNvPicPr>
@@ -3244,7 +3061,119 @@
         </p:blipFill>
         <p:spPr>
           <a:xfrm>
-            <a:off x="5165771" y="2057400"/>
+            <a:off x="6019800" y="3322711"/>
+            <a:ext cx="6172200" cy="3509957"/>
+          </a:xfrm>
+          <a:prstGeom prst="rect">
+            <a:avLst/>
+          </a:prstGeom>
+        </p:spPr>
+      </p:pic>
+      <p:sp>
+        <p:nvSpPr>
+          <p:cNvPr id="6" name="Text Placeholder 5"/>
+          <p:cNvSpPr>
+            <a:spLocks noGrp="1"/>
+          </p:cNvSpPr>
+          <p:nvPr>
+            <p:ph type="body" sz="half" idx="2"/>
+          </p:nvPr>
+        </p:nvSpPr>
+        <p:spPr/>
+        <p:txBody>
+          <a:bodyPr>
+            <a:normAutofit fontScale="92500" lnSpcReduction="10000"/>
+          </a:bodyPr>
+          <a:lstStyle/>
+          <a:p>
+            <a:pPr marL="285750" indent="-285750">
+              <a:buFont typeface="Arial" panose="020B0604020202020204" pitchFamily="34" charset="0"/>
+              <a:buChar char="•"/>
+            </a:pPr>
+            <a:r>
+              <a:rPr lang="en-IN" dirty="0"/>
+              <a:t>A version control platform where one can store and manager code keeping track of changes.</a:t>
+            </a:r>
+          </a:p>
+          <a:p>
+            <a:pPr marL="285750" indent="-285750">
+              <a:buFont typeface="Arial" panose="020B0604020202020204" pitchFamily="34" charset="0"/>
+              <a:buChar char="•"/>
+            </a:pPr>
+            <a:r>
+              <a:rPr lang="en-IN" dirty="0"/>
+              <a:t>Multiple people on the team can review code and merge changes simultaneously</a:t>
+            </a:r>
+          </a:p>
+          <a:p>
+            <a:pPr marL="285750" indent="-285750">
+              <a:buFont typeface="Arial" panose="020B0604020202020204" pitchFamily="34" charset="0"/>
+              <a:buChar char="•"/>
+            </a:pPr>
+            <a:r>
+              <a:rPr lang="en-IN" dirty="0"/>
+              <a:t>Helps simplify development process and enhances </a:t>
+            </a:r>
+            <a:r>
+              <a:rPr lang="en-IN" dirty="0" smtClean="0"/>
+              <a:t>productivity</a:t>
+            </a:r>
+            <a:endParaRPr lang="en-IN" dirty="0" smtClean="0"/>
+          </a:p>
+          <a:p>
+            <a:pPr marL="285750" indent="-285750">
+              <a:buFont typeface="Arial" panose="020B0604020202020204" pitchFamily="34" charset="0"/>
+              <a:buChar char="•"/>
+            </a:pPr>
+            <a:r>
+              <a:rPr lang="en-IN" dirty="0" smtClean="0"/>
+              <a:t>These </a:t>
+            </a:r>
+            <a:r>
+              <a:rPr lang="en-IN" dirty="0" smtClean="0"/>
+              <a:t>are the commands I used to push files from my local system to my GitHub repository</a:t>
+            </a:r>
+          </a:p>
+          <a:p>
+            <a:pPr marL="285750" indent="-285750">
+              <a:buFont typeface="Arial" panose="020B0604020202020204" pitchFamily="34" charset="0"/>
+              <a:buChar char="•"/>
+            </a:pPr>
+            <a:r>
+              <a:rPr lang="en-IN" dirty="0" smtClean="0"/>
+              <a:t>First I cloned the GitHub repository on my local machine and used add and commit commands to get the files ready for pushing it onto the master branch of my repository.</a:t>
+            </a:r>
+          </a:p>
+          <a:p>
+            <a:pPr marL="285750" indent="-285750">
+              <a:buFont typeface="Arial" panose="020B0604020202020204" pitchFamily="34" charset="0"/>
+              <a:buChar char="•"/>
+            </a:pPr>
+            <a:r>
+              <a:rPr lang="en-IN" dirty="0" smtClean="0"/>
+              <a:t>These commands can be used to push changes into the branch when necessary</a:t>
+            </a:r>
+            <a:endParaRPr lang="en-IN" dirty="0"/>
+          </a:p>
+        </p:txBody>
+      </p:sp>
+      <p:pic>
+        <p:nvPicPr>
+          <p:cNvPr id="5" name="Content Placeholder 8"/>
+          <p:cNvPicPr>
+            <a:picLocks noChangeAspect="1"/>
+          </p:cNvPicPr>
+          <p:nvPr/>
+        </p:nvPicPr>
+        <p:blipFill>
+          <a:blip r:embed="rId3"/>
+          <a:stretch>
+            <a:fillRect/>
+          </a:stretch>
+        </p:blipFill>
+        <p:spPr>
+          <a:xfrm>
+            <a:off x="6019800" y="257373"/>
             <a:ext cx="6172200" cy="2876023"/>
           </a:xfrm>
           <a:prstGeom prst="rect">
@@ -3252,182 +3181,6 @@
           </a:prstGeom>
         </p:spPr>
       </p:pic>
-    </p:spTree>
-    <p:extLst>
-      <p:ext uri="{BB962C8B-B14F-4D97-AF65-F5344CB8AC3E}">
-        <p14:creationId xmlns:p14="http://schemas.microsoft.com/office/powerpoint/2010/main" val="2782287981"/>
-      </p:ext>
-    </p:extLst>
-  </p:cSld>
-  <p:clrMapOvr>
-    <a:masterClrMapping/>
-  </p:clrMapOvr>
-</p:sld>
-</file>
-
-<file path=ppt/slides/slide3.xml><?xml version="1.0" encoding="utf-8"?>
-<p:sld xmlns:a="http://schemas.openxmlformats.org/drawingml/2006/main" xmlns:r="http://schemas.openxmlformats.org/officeDocument/2006/relationships" xmlns:p="http://schemas.openxmlformats.org/presentationml/2006/main">
-  <p:cSld>
-    <p:bg>
-      <p:bgPr>
-        <a:gradFill>
-          <a:gsLst>
-            <a:gs pos="56000">
-              <a:srgbClr val="D6E6F5"/>
-            </a:gs>
-            <a:gs pos="0">
-              <a:schemeClr val="accent1">
-                <a:lumMod val="5000"/>
-                <a:lumOff val="95000"/>
-              </a:schemeClr>
-            </a:gs>
-            <a:gs pos="74000">
-              <a:schemeClr val="accent1">
-                <a:lumMod val="45000"/>
-                <a:lumOff val="55000"/>
-              </a:schemeClr>
-            </a:gs>
-            <a:gs pos="83000">
-              <a:schemeClr val="accent1">
-                <a:lumMod val="45000"/>
-                <a:lumOff val="55000"/>
-              </a:schemeClr>
-            </a:gs>
-            <a:gs pos="100000">
-              <a:schemeClr val="accent1">
-                <a:lumMod val="30000"/>
-                <a:lumOff val="70000"/>
-              </a:schemeClr>
-            </a:gs>
-          </a:gsLst>
-          <a:lin ang="5400000" scaled="1"/>
-        </a:gradFill>
-        <a:effectLst/>
-      </p:bgPr>
-    </p:bg>
-    <p:spTree>
-      <p:nvGrpSpPr>
-        <p:cNvPr id="1" name=""/>
-        <p:cNvGrpSpPr/>
-        <p:nvPr/>
-      </p:nvGrpSpPr>
-      <p:grpSpPr>
-        <a:xfrm>
-          <a:off x="0" y="0"/>
-          <a:ext cx="0" cy="0"/>
-          <a:chOff x="0" y="0"/>
-          <a:chExt cx="0" cy="0"/>
-        </a:xfrm>
-      </p:grpSpPr>
-      <p:sp>
-        <p:nvSpPr>
-          <p:cNvPr id="4" name="Title 3"/>
-          <p:cNvSpPr>
-            <a:spLocks noGrp="1"/>
-          </p:cNvSpPr>
-          <p:nvPr>
-            <p:ph type="title"/>
-          </p:nvPr>
-        </p:nvSpPr>
-        <p:spPr/>
-        <p:txBody>
-          <a:bodyPr/>
-          <a:lstStyle/>
-          <a:p>
-            <a:pPr algn="ctr"/>
-            <a:r>
-              <a:rPr lang="en-IN" b="1" dirty="0">
-                <a:latin typeface="Arial Black" panose="020B0A04020102020204" pitchFamily="34" charset="0"/>
-              </a:rPr>
-              <a:t>G</a:t>
-            </a:r>
-            <a:r>
-              <a:rPr lang="en-IN" b="1" dirty="0" smtClean="0">
-                <a:latin typeface="Arial Black" panose="020B0A04020102020204" pitchFamily="34" charset="0"/>
-              </a:rPr>
-              <a:t>itHub</a:t>
-            </a:r>
-            <a:r>
-              <a:rPr lang="en-IN" dirty="0" smtClean="0"/>
-              <a:t> </a:t>
-            </a:r>
-            <a:endParaRPr lang="en-IN" dirty="0"/>
-          </a:p>
-        </p:txBody>
-      </p:sp>
-      <p:pic>
-        <p:nvPicPr>
-          <p:cNvPr id="7" name="Content Placeholder 6"/>
-          <p:cNvPicPr>
-            <a:picLocks noGrp="1" noChangeAspect="1"/>
-          </p:cNvPicPr>
-          <p:nvPr>
-            <p:ph idx="1"/>
-          </p:nvPr>
-        </p:nvPicPr>
-        <p:blipFill>
-          <a:blip r:embed="rId2"/>
-          <a:stretch>
-            <a:fillRect/>
-          </a:stretch>
-        </p:blipFill>
-        <p:spPr>
-          <a:xfrm>
-            <a:off x="5183188" y="1669259"/>
-            <a:ext cx="6172200" cy="3509957"/>
-          </a:xfrm>
-          <a:prstGeom prst="rect">
-            <a:avLst/>
-          </a:prstGeom>
-        </p:spPr>
-      </p:pic>
-      <p:sp>
-        <p:nvSpPr>
-          <p:cNvPr id="6" name="Text Placeholder 5"/>
-          <p:cNvSpPr>
-            <a:spLocks noGrp="1"/>
-          </p:cNvSpPr>
-          <p:nvPr>
-            <p:ph type="body" sz="half" idx="2"/>
-          </p:nvPr>
-        </p:nvSpPr>
-        <p:spPr/>
-        <p:txBody>
-          <a:bodyPr/>
-          <a:lstStyle/>
-          <a:p>
-            <a:pPr marL="285750" indent="-285750">
-              <a:buFont typeface="Arial" panose="020B0604020202020204" pitchFamily="34" charset="0"/>
-              <a:buChar char="•"/>
-            </a:pPr>
-            <a:r>
-              <a:rPr lang="en-IN" dirty="0" smtClean="0"/>
-              <a:t>These are the commands I used to push files from my local system to my GitHub repository</a:t>
-            </a:r>
-          </a:p>
-          <a:p>
-            <a:pPr marL="285750" indent="-285750">
-              <a:buFont typeface="Arial" panose="020B0604020202020204" pitchFamily="34" charset="0"/>
-              <a:buChar char="•"/>
-            </a:pPr>
-            <a:r>
-              <a:rPr lang="en-IN" dirty="0" smtClean="0"/>
-              <a:t>First I cloned the GitHub repository on my local machine and used add and commit commands to get the files ready for pushing it onto the master branch of my repository.</a:t>
-            </a:r>
-          </a:p>
-          <a:p>
-            <a:pPr marL="285750" indent="-285750">
-              <a:buFont typeface="Arial" panose="020B0604020202020204" pitchFamily="34" charset="0"/>
-              <a:buChar char="•"/>
-            </a:pPr>
-            <a:r>
-              <a:rPr lang="en-IN" dirty="0" smtClean="0"/>
-              <a:t>These commands can be used to push changes into the branch when necessary</a:t>
-            </a:r>
-            <a:endParaRPr lang="en-IN" dirty="0"/>
-          </a:p>
-        </p:txBody>
-      </p:sp>
     </p:spTree>
     <p:extLst>
       <p:ext uri="{BB962C8B-B14F-4D97-AF65-F5344CB8AC3E}">
@@ -3441,7 +3194,7 @@
 </p:sld>
 </file>
 
-<file path=ppt/slides/slide4.xml><?xml version="1.0" encoding="utf-8"?>
+<file path=ppt/slides/slide2.xml><?xml version="1.0" encoding="utf-8"?>
 <p:sld xmlns:a="http://schemas.openxmlformats.org/drawingml/2006/main" xmlns:r="http://schemas.openxmlformats.org/officeDocument/2006/relationships" xmlns:p="http://schemas.openxmlformats.org/presentationml/2006/main">
   <p:cSld>
     <p:bg>
@@ -3567,6 +3320,40 @@
           </a:prstGeom>
         </p:spPr>
       </p:pic>
+      <p:sp>
+        <p:nvSpPr>
+          <p:cNvPr id="2" name="TextBox 1"/>
+          <p:cNvSpPr txBox="1"/>
+          <p:nvPr/>
+        </p:nvSpPr>
+        <p:spPr>
+          <a:xfrm>
+            <a:off x="6751192" y="111596"/>
+            <a:ext cx="5683794" cy="707886"/>
+          </a:xfrm>
+          <a:prstGeom prst="rect">
+            <a:avLst/>
+          </a:prstGeom>
+          <a:noFill/>
+        </p:spPr>
+        <p:txBody>
+          <a:bodyPr wrap="square" rtlCol="0">
+            <a:spAutoFit/>
+          </a:bodyPr>
+          <a:lstStyle/>
+          <a:p>
+            <a:r>
+              <a:rPr lang="en-IN" sz="4000" b="1" dirty="0" smtClean="0">
+                <a:latin typeface="Arial Black" panose="020B0A04020102020204" pitchFamily="34" charset="0"/>
+              </a:rPr>
+              <a:t>Network Graph</a:t>
+            </a:r>
+            <a:endParaRPr lang="en-IN" sz="4000" b="1" dirty="0">
+              <a:latin typeface="Arial Black" panose="020B0A04020102020204" pitchFamily="34" charset="0"/>
+            </a:endParaRPr>
+          </a:p>
+        </p:txBody>
+      </p:sp>
     </p:spTree>
     <p:extLst>
       <p:ext uri="{BB962C8B-B14F-4D97-AF65-F5344CB8AC3E}">

</xml_diff>